<commit_message>
Update brave people 150
</commit_message>
<xml_diff>
--- a/img/img.pptx
+++ b/img/img.pptx
@@ -6,6 +6,7 @@
   </p:sldMasterIdLst>
   <p:sldIdLst>
     <p:sldId id="256" r:id="rId2"/>
+    <p:sldId id="257" r:id="rId3"/>
   </p:sldIdLst>
   <p:sldSz cx="12192000" cy="6858000"/>
   <p:notesSz cx="6858000" cy="9144000"/>
@@ -104,6 +105,11 @@
       </a:defRPr>
     </a:lvl9pPr>
   </p:defaultTextStyle>
+  <p:extLst>
+    <p:ext uri="{EFAFB233-063F-42B5-8137-9DF3F51BA10A}">
+      <p15:sldGuideLst xmlns:p15="http://schemas.microsoft.com/office/powerpoint/2012/main"/>
+    </p:ext>
+  </p:extLst>
 </p:presentation>
 </file>
 
@@ -254,7 +260,7 @@
           <a:p>
             <a:fld id="{B24269AA-6B5D-4D5A-B50E-E1467D37A8CC}" type="datetimeFigureOut">
               <a:rPr lang="ko-KR" altLang="en-US" smtClean="0"/>
-              <a:t>2020-09-30</a:t>
+              <a:t>2020-11-21</a:t>
             </a:fld>
             <a:endParaRPr lang="ko-KR" altLang="en-US"/>
           </a:p>
@@ -452,7 +458,7 @@
           <a:p>
             <a:fld id="{B24269AA-6B5D-4D5A-B50E-E1467D37A8CC}" type="datetimeFigureOut">
               <a:rPr lang="ko-KR" altLang="en-US" smtClean="0"/>
-              <a:t>2020-09-30</a:t>
+              <a:t>2020-11-21</a:t>
             </a:fld>
             <a:endParaRPr lang="ko-KR" altLang="en-US"/>
           </a:p>
@@ -660,7 +666,7 @@
           <a:p>
             <a:fld id="{B24269AA-6B5D-4D5A-B50E-E1467D37A8CC}" type="datetimeFigureOut">
               <a:rPr lang="ko-KR" altLang="en-US" smtClean="0"/>
-              <a:t>2020-09-30</a:t>
+              <a:t>2020-11-21</a:t>
             </a:fld>
             <a:endParaRPr lang="ko-KR" altLang="en-US"/>
           </a:p>
@@ -858,7 +864,7 @@
           <a:p>
             <a:fld id="{B24269AA-6B5D-4D5A-B50E-E1467D37A8CC}" type="datetimeFigureOut">
               <a:rPr lang="ko-KR" altLang="en-US" smtClean="0"/>
-              <a:t>2020-09-30</a:t>
+              <a:t>2020-11-21</a:t>
             </a:fld>
             <a:endParaRPr lang="ko-KR" altLang="en-US"/>
           </a:p>
@@ -1133,7 +1139,7 @@
           <a:p>
             <a:fld id="{B24269AA-6B5D-4D5A-B50E-E1467D37A8CC}" type="datetimeFigureOut">
               <a:rPr lang="ko-KR" altLang="en-US" smtClean="0"/>
-              <a:t>2020-09-30</a:t>
+              <a:t>2020-11-21</a:t>
             </a:fld>
             <a:endParaRPr lang="ko-KR" altLang="en-US"/>
           </a:p>
@@ -1398,7 +1404,7 @@
           <a:p>
             <a:fld id="{B24269AA-6B5D-4D5A-B50E-E1467D37A8CC}" type="datetimeFigureOut">
               <a:rPr lang="ko-KR" altLang="en-US" smtClean="0"/>
-              <a:t>2020-09-30</a:t>
+              <a:t>2020-11-21</a:t>
             </a:fld>
             <a:endParaRPr lang="ko-KR" altLang="en-US"/>
           </a:p>
@@ -1810,7 +1816,7 @@
           <a:p>
             <a:fld id="{B24269AA-6B5D-4D5A-B50E-E1467D37A8CC}" type="datetimeFigureOut">
               <a:rPr lang="ko-KR" altLang="en-US" smtClean="0"/>
-              <a:t>2020-09-30</a:t>
+              <a:t>2020-11-21</a:t>
             </a:fld>
             <a:endParaRPr lang="ko-KR" altLang="en-US"/>
           </a:p>
@@ -1951,7 +1957,7 @@
           <a:p>
             <a:fld id="{B24269AA-6B5D-4D5A-B50E-E1467D37A8CC}" type="datetimeFigureOut">
               <a:rPr lang="ko-KR" altLang="en-US" smtClean="0"/>
-              <a:t>2020-09-30</a:t>
+              <a:t>2020-11-21</a:t>
             </a:fld>
             <a:endParaRPr lang="ko-KR" altLang="en-US"/>
           </a:p>
@@ -2064,7 +2070,7 @@
           <a:p>
             <a:fld id="{B24269AA-6B5D-4D5A-B50E-E1467D37A8CC}" type="datetimeFigureOut">
               <a:rPr lang="ko-KR" altLang="en-US" smtClean="0"/>
-              <a:t>2020-09-30</a:t>
+              <a:t>2020-11-21</a:t>
             </a:fld>
             <a:endParaRPr lang="ko-KR" altLang="en-US"/>
           </a:p>
@@ -2375,7 +2381,7 @@
           <a:p>
             <a:fld id="{B24269AA-6B5D-4D5A-B50E-E1467D37A8CC}" type="datetimeFigureOut">
               <a:rPr lang="ko-KR" altLang="en-US" smtClean="0"/>
-              <a:t>2020-09-30</a:t>
+              <a:t>2020-11-21</a:t>
             </a:fld>
             <a:endParaRPr lang="ko-KR" altLang="en-US"/>
           </a:p>
@@ -2663,7 +2669,7 @@
           <a:p>
             <a:fld id="{B24269AA-6B5D-4D5A-B50E-E1467D37A8CC}" type="datetimeFigureOut">
               <a:rPr lang="ko-KR" altLang="en-US" smtClean="0"/>
-              <a:t>2020-09-30</a:t>
+              <a:t>2020-11-21</a:t>
             </a:fld>
             <a:endParaRPr lang="ko-KR" altLang="en-US"/>
           </a:p>
@@ -2904,7 +2910,7 @@
           <a:p>
             <a:fld id="{B24269AA-6B5D-4D5A-B50E-E1467D37A8CC}" type="datetimeFigureOut">
               <a:rPr lang="ko-KR" altLang="en-US" smtClean="0"/>
-              <a:t>2020-09-30</a:t>
+              <a:t>2020-11-21</a:t>
             </a:fld>
             <a:endParaRPr lang="ko-KR" altLang="en-US"/>
           </a:p>
@@ -3564,6 +3570,353 @@
 </p:sld>
 </file>
 
+<file path=ppt/slides/slide2.xml><?xml version="1.0" encoding="utf-8"?>
+<p:sld xmlns:a="http://schemas.openxmlformats.org/drawingml/2006/main" xmlns:r="http://schemas.openxmlformats.org/officeDocument/2006/relationships" xmlns:p="http://schemas.openxmlformats.org/presentationml/2006/main">
+  <p:cSld>
+    <p:bg>
+      <p:bgPr>
+        <a:solidFill>
+          <a:schemeClr val="tx1"/>
+        </a:solidFill>
+        <a:effectLst/>
+      </p:bgPr>
+    </p:bg>
+    <p:spTree>
+      <p:nvGrpSpPr>
+        <p:cNvPr id="1" name=""/>
+        <p:cNvGrpSpPr/>
+        <p:nvPr/>
+      </p:nvGrpSpPr>
+      <p:grpSpPr>
+        <a:xfrm>
+          <a:off x="0" y="0"/>
+          <a:ext cx="0" cy="0"/>
+          <a:chOff x="0" y="0"/>
+          <a:chExt cx="0" cy="0"/>
+        </a:xfrm>
+      </p:grpSpPr>
+      <p:sp>
+        <p:nvSpPr>
+          <p:cNvPr id="4" name="TextBox 3">
+            <a:extLst>
+              <a:ext uri="{FF2B5EF4-FFF2-40B4-BE49-F238E27FC236}">
+                <a16:creationId xmlns:a16="http://schemas.microsoft.com/office/drawing/2014/main" id="{34E78129-C08E-4932-9C65-01BB59B18767}"/>
+              </a:ext>
+            </a:extLst>
+          </p:cNvPr>
+          <p:cNvSpPr txBox="1"/>
+          <p:nvPr/>
+        </p:nvSpPr>
+        <p:spPr>
+          <a:xfrm>
+            <a:off x="3649224" y="1975367"/>
+            <a:ext cx="5198352" cy="1107996"/>
+          </a:xfrm>
+          <a:prstGeom prst="rect">
+            <a:avLst/>
+          </a:prstGeom>
+          <a:noFill/>
+        </p:spPr>
+        <p:txBody>
+          <a:bodyPr wrap="square" rtlCol="0">
+            <a:spAutoFit/>
+          </a:bodyPr>
+          <a:lstStyle/>
+          <a:p>
+            <a:r>
+              <a:rPr lang="en-US" altLang="ko-KR" sz="6600">
+                <a:gradFill flip="none" rotWithShape="1">
+                  <a:gsLst>
+                    <a:gs pos="0">
+                      <a:srgbClr val="2FE0EC"/>
+                    </a:gs>
+                    <a:gs pos="100000">
+                      <a:srgbClr val="3E78FB"/>
+                    </a:gs>
+                  </a:gsLst>
+                  <a:lin ang="0" scaled="1"/>
+                  <a:tileRect/>
+                </a:gradFill>
+                <a:latin typeface="나눔스퀘어_ac ExtraBold" panose="020B0600000101010101" pitchFamily="50" charset="-127"/>
+                <a:ea typeface="나눔스퀘어_ac ExtraBold" panose="020B0600000101010101" pitchFamily="50" charset="-127"/>
+              </a:rPr>
+              <a:t>DEV EVENT</a:t>
+            </a:r>
+            <a:endParaRPr lang="ko-KR" altLang="en-US" sz="6600">
+              <a:gradFill flip="none" rotWithShape="1">
+                <a:gsLst>
+                  <a:gs pos="0">
+                    <a:srgbClr val="2FE0EC"/>
+                  </a:gs>
+                  <a:gs pos="100000">
+                    <a:srgbClr val="3E78FB"/>
+                  </a:gs>
+                </a:gsLst>
+                <a:lin ang="0" scaled="1"/>
+                <a:tileRect/>
+              </a:gradFill>
+              <a:latin typeface="나눔스퀘어_ac ExtraBold" panose="020B0600000101010101" pitchFamily="50" charset="-127"/>
+              <a:ea typeface="나눔스퀘어_ac ExtraBold" panose="020B0600000101010101" pitchFamily="50" charset="-127"/>
+            </a:endParaRPr>
+          </a:p>
+        </p:txBody>
+      </p:sp>
+      <p:sp>
+        <p:nvSpPr>
+          <p:cNvPr id="5" name="직사각형 4">
+            <a:extLst>
+              <a:ext uri="{FF2B5EF4-FFF2-40B4-BE49-F238E27FC236}">
+                <a16:creationId xmlns:a16="http://schemas.microsoft.com/office/drawing/2014/main" id="{B4D525C2-5224-4BEF-9454-F42A2DF4E3EC}"/>
+              </a:ext>
+            </a:extLst>
+          </p:cNvPr>
+          <p:cNvSpPr/>
+          <p:nvPr/>
+        </p:nvSpPr>
+        <p:spPr>
+          <a:xfrm>
+            <a:off x="2087418" y="1698170"/>
+            <a:ext cx="8321964" cy="2500605"/>
+          </a:xfrm>
+          <a:prstGeom prst="rect">
+            <a:avLst/>
+          </a:prstGeom>
+          <a:noFill/>
+          <a:ln>
+            <a:solidFill>
+              <a:schemeClr val="bg1"/>
+            </a:solidFill>
+          </a:ln>
+        </p:spPr>
+        <p:style>
+          <a:lnRef idx="2">
+            <a:schemeClr val="accent1">
+              <a:shade val="50000"/>
+            </a:schemeClr>
+          </a:lnRef>
+          <a:fillRef idx="1">
+            <a:schemeClr val="accent1"/>
+          </a:fillRef>
+          <a:effectRef idx="0">
+            <a:schemeClr val="accent1"/>
+          </a:effectRef>
+          <a:fontRef idx="minor">
+            <a:schemeClr val="lt1"/>
+          </a:fontRef>
+        </p:style>
+        <p:txBody>
+          <a:bodyPr rtlCol="0" anchor="ctr"/>
+          <a:lstStyle/>
+          <a:p>
+            <a:pPr algn="ctr"/>
+            <a:endParaRPr lang="ko-KR" altLang="en-US"/>
+          </a:p>
+        </p:txBody>
+      </p:sp>
+      <p:sp>
+        <p:nvSpPr>
+          <p:cNvPr id="6" name="TextBox 5">
+            <a:extLst>
+              <a:ext uri="{FF2B5EF4-FFF2-40B4-BE49-F238E27FC236}">
+                <a16:creationId xmlns:a16="http://schemas.microsoft.com/office/drawing/2014/main" id="{60779B3E-CC2D-4F39-A9FB-7F60EF8DA00C}"/>
+              </a:ext>
+            </a:extLst>
+          </p:cNvPr>
+          <p:cNvSpPr txBox="1"/>
+          <p:nvPr/>
+        </p:nvSpPr>
+        <p:spPr>
+          <a:xfrm>
+            <a:off x="3745346" y="3830672"/>
+            <a:ext cx="4701308" cy="307777"/>
+          </a:xfrm>
+          <a:prstGeom prst="rect">
+            <a:avLst/>
+          </a:prstGeom>
+          <a:noFill/>
+        </p:spPr>
+        <p:txBody>
+          <a:bodyPr wrap="square" rtlCol="0">
+            <a:spAutoFit/>
+          </a:bodyPr>
+          <a:lstStyle/>
+          <a:p>
+            <a:pPr algn="ctr"/>
+            <a:r>
+              <a:rPr lang="ko-KR" altLang="en-US" sz="1400">
+                <a:solidFill>
+                  <a:schemeClr val="bg1"/>
+                </a:solidFill>
+                <a:latin typeface="여기어때 잘난체 OTF" panose="020B0600000101010101" pitchFamily="34" charset="-127"/>
+                <a:ea typeface="여기어때 잘난체 OTF" panose="020B0600000101010101" pitchFamily="34" charset="-127"/>
+              </a:rPr>
+              <a:t>용감한 친구들</a:t>
+            </a:r>
+            <a:r>
+              <a:rPr lang="ko-KR" altLang="en-US" sz="1400" b="0" i="0">
+                <a:solidFill>
+                  <a:schemeClr val="bg1"/>
+                </a:solidFill>
+                <a:effectLst/>
+                <a:latin typeface="나눔스퀘어_ac ExtraBold" panose="020B0600000101010101" pitchFamily="50" charset="-127"/>
+                <a:ea typeface="나눔스퀘어_ac ExtraBold" panose="020B0600000101010101" pitchFamily="50" charset="-127"/>
+              </a:rPr>
+              <a:t> </a:t>
+            </a:r>
+            <a:r>
+              <a:rPr lang="en-US" altLang="ko-KR" sz="1400">
+                <a:solidFill>
+                  <a:schemeClr val="bg1"/>
+                </a:solidFill>
+                <a:latin typeface="나눔스퀘어_ac ExtraBold" panose="020B0600000101010101" pitchFamily="50" charset="-127"/>
+                <a:ea typeface="나눔스퀘어_ac ExtraBold" panose="020B0600000101010101" pitchFamily="50" charset="-127"/>
+              </a:rPr>
+              <a:t>with</a:t>
+            </a:r>
+            <a:r>
+              <a:rPr lang="en-US" altLang="ko-KR" sz="1400" b="0" i="0">
+                <a:solidFill>
+                  <a:schemeClr val="bg1"/>
+                </a:solidFill>
+                <a:effectLst/>
+                <a:latin typeface="나눔스퀘어_ac ExtraBold" panose="020B0600000101010101" pitchFamily="50" charset="-127"/>
+                <a:ea typeface="나눔스퀘어_ac ExtraBold" panose="020B0600000101010101" pitchFamily="50" charset="-127"/>
+              </a:rPr>
+              <a:t> </a:t>
+            </a:r>
+            <a:r>
+              <a:rPr lang="ko-KR" altLang="en-US" sz="1400" b="0" i="0">
+                <a:solidFill>
+                  <a:schemeClr val="bg1"/>
+                </a:solidFill>
+                <a:effectLst/>
+                <a:latin typeface="나눔스퀘어_ac ExtraBold" panose="020B0600000101010101" pitchFamily="50" charset="-127"/>
+                <a:ea typeface="나눔스퀘어_ac ExtraBold" panose="020B0600000101010101" pitchFamily="50" charset="-127"/>
+              </a:rPr>
+              <a:t>남송리 삼번지 </a:t>
+            </a:r>
+            <a:endParaRPr lang="en-US" altLang="ko-KR" sz="1400" b="0" i="0">
+              <a:solidFill>
+                <a:schemeClr val="bg1"/>
+              </a:solidFill>
+              <a:effectLst/>
+              <a:latin typeface="나눔스퀘어_ac ExtraBold" panose="020B0600000101010101" pitchFamily="50" charset="-127"/>
+              <a:ea typeface="나눔스퀘어_ac ExtraBold" panose="020B0600000101010101" pitchFamily="50" charset="-127"/>
+            </a:endParaRPr>
+          </a:p>
+        </p:txBody>
+      </p:sp>
+      <p:sp>
+        <p:nvSpPr>
+          <p:cNvPr id="8" name="TextBox 7">
+            <a:extLst>
+              <a:ext uri="{FF2B5EF4-FFF2-40B4-BE49-F238E27FC236}">
+                <a16:creationId xmlns:a16="http://schemas.microsoft.com/office/drawing/2014/main" id="{4F39EC5A-C906-4EA4-8673-EFF4658AD7A4}"/>
+              </a:ext>
+            </a:extLst>
+          </p:cNvPr>
+          <p:cNvSpPr txBox="1"/>
+          <p:nvPr/>
+        </p:nvSpPr>
+        <p:spPr>
+          <a:xfrm>
+            <a:off x="6591725" y="2822530"/>
+            <a:ext cx="1826936" cy="276999"/>
+          </a:xfrm>
+          <a:prstGeom prst="rect">
+            <a:avLst/>
+          </a:prstGeom>
+          <a:noFill/>
+        </p:spPr>
+        <p:txBody>
+          <a:bodyPr wrap="square" rtlCol="0">
+            <a:spAutoFit/>
+          </a:bodyPr>
+          <a:lstStyle/>
+          <a:p>
+            <a:pPr algn="r"/>
+            <a:r>
+              <a:rPr lang="en-US" altLang="ko-KR" sz="1200">
+                <a:solidFill>
+                  <a:schemeClr val="bg1"/>
+                </a:solidFill>
+                <a:latin typeface="나눔스퀘어_ac ExtraBold" panose="020B0600000101010101" pitchFamily="50" charset="-127"/>
+                <a:ea typeface="나눔스퀘어_ac ExtraBold" panose="020B0600000101010101" pitchFamily="50" charset="-127"/>
+              </a:rPr>
+              <a:t>Since 20. 08</a:t>
+            </a:r>
+            <a:endParaRPr lang="en-US" altLang="ko-KR" sz="1200" b="0" i="0">
+              <a:solidFill>
+                <a:schemeClr val="bg1"/>
+              </a:solidFill>
+              <a:effectLst/>
+              <a:latin typeface="나눔스퀘어_ac ExtraBold" panose="020B0600000101010101" pitchFamily="50" charset="-127"/>
+              <a:ea typeface="나눔스퀘어_ac ExtraBold" panose="020B0600000101010101" pitchFamily="50" charset="-127"/>
+            </a:endParaRPr>
+          </a:p>
+        </p:txBody>
+      </p:sp>
+      <p:sp>
+        <p:nvSpPr>
+          <p:cNvPr id="9" name="TextBox 8">
+            <a:extLst>
+              <a:ext uri="{FF2B5EF4-FFF2-40B4-BE49-F238E27FC236}">
+                <a16:creationId xmlns:a16="http://schemas.microsoft.com/office/drawing/2014/main" id="{60EA68F8-26E7-44DF-9140-39BF66E8A018}"/>
+              </a:ext>
+            </a:extLst>
+          </p:cNvPr>
+          <p:cNvSpPr txBox="1"/>
+          <p:nvPr/>
+        </p:nvSpPr>
+        <p:spPr>
+          <a:xfrm>
+            <a:off x="3838922" y="3087573"/>
+            <a:ext cx="4514155" cy="523220"/>
+          </a:xfrm>
+          <a:prstGeom prst="rect">
+            <a:avLst/>
+          </a:prstGeom>
+          <a:noFill/>
+        </p:spPr>
+        <p:txBody>
+          <a:bodyPr wrap="square" rtlCol="0">
+            <a:spAutoFit/>
+          </a:bodyPr>
+          <a:lstStyle/>
+          <a:p>
+            <a:pPr algn="ctr"/>
+            <a:r>
+              <a:rPr lang="en-US" altLang="ko-KR" sz="2800" b="1">
+                <a:solidFill>
+                  <a:schemeClr val="bg1"/>
+                </a:solidFill>
+              </a:rPr>
+              <a:t>150+Stars </a:t>
+            </a:r>
+            <a:r>
+              <a:rPr lang="ko-KR" altLang="en-US" sz="2800" b="1">
+                <a:solidFill>
+                  <a:schemeClr val="bg1"/>
+                </a:solidFill>
+              </a:rPr>
+              <a:t>달성</a:t>
+            </a:r>
+          </a:p>
+        </p:txBody>
+      </p:sp>
+    </p:spTree>
+    <p:extLst>
+      <p:ext uri="{BB962C8B-B14F-4D97-AF65-F5344CB8AC3E}">
+        <p14:creationId xmlns:p14="http://schemas.microsoft.com/office/powerpoint/2010/main" val="2061801440"/>
+      </p:ext>
+    </p:extLst>
+  </p:cSld>
+  <p:clrMapOvr>
+    <a:masterClrMapping/>
+  </p:clrMapOvr>
+</p:sld>
+</file>
+
 <file path=ppt/theme/theme1.xml><?xml version="1.0" encoding="utf-8"?>
 <a:theme xmlns:a="http://schemas.openxmlformats.org/drawingml/2006/main" name="Office 테마">
   <a:themeElements>

</xml_diff>

<commit_message>
update dev event img
</commit_message>
<xml_diff>
--- a/img/img.pptx
+++ b/img/img.pptx
@@ -3609,8 +3609,8 @@
         </p:nvSpPr>
         <p:spPr>
           <a:xfrm>
-            <a:off x="3649224" y="1975367"/>
-            <a:ext cx="5198352" cy="1107996"/>
+            <a:off x="3292628" y="1900722"/>
+            <a:ext cx="5606743" cy="1323439"/>
           </a:xfrm>
           <a:prstGeom prst="rect">
             <a:avLst/>
@@ -3624,7 +3624,7 @@
           <a:lstStyle/>
           <a:p>
             <a:r>
-              <a:rPr lang="en-US" altLang="ko-KR" sz="6600">
+              <a:rPr lang="en-US" altLang="ko-KR" sz="8000" spc="-300">
                 <a:gradFill flip="none" rotWithShape="1">
                   <a:gsLst>
                     <a:gs pos="0">
@@ -3642,7 +3642,7 @@
               </a:rPr>
               <a:t>DEV EVENT</a:t>
             </a:r>
-            <a:endParaRPr lang="ko-KR" altLang="en-US" sz="6600">
+            <a:endParaRPr lang="ko-KR" altLang="en-US" sz="8000" spc="-300">
               <a:gradFill flip="none" rotWithShape="1">
                 <a:gsLst>
                   <a:gs pos="0">
@@ -3675,8 +3675,8 @@
         </p:nvSpPr>
         <p:spPr>
           <a:xfrm>
-            <a:off x="2087418" y="1698170"/>
-            <a:ext cx="8321964" cy="2500605"/>
+            <a:off x="2087418" y="1698171"/>
+            <a:ext cx="8321964" cy="2444622"/>
           </a:xfrm>
           <a:prstGeom prst="rect">
             <a:avLst/>
@@ -3727,7 +3727,7 @@
         </p:nvSpPr>
         <p:spPr>
           <a:xfrm>
-            <a:off x="3745346" y="3830672"/>
+            <a:off x="3745346" y="3719293"/>
             <a:ext cx="4701308" cy="307777"/>
           </a:xfrm>
           <a:prstGeom prst="rect">
@@ -3820,7 +3820,7 @@
         </p:nvSpPr>
         <p:spPr>
           <a:xfrm>
-            <a:off x="6591725" y="2822530"/>
+            <a:off x="6875635" y="2876425"/>
             <a:ext cx="1826936" cy="276999"/>
           </a:xfrm>
           <a:prstGeom prst="rect">
@@ -3901,6 +3901,63 @@
               </a:rPr>
               <a:t>달성</a:t>
             </a:r>
+          </a:p>
+        </p:txBody>
+      </p:sp>
+      <p:sp>
+        <p:nvSpPr>
+          <p:cNvPr id="7" name="사각형: 둥근 모서리 6">
+            <a:extLst>
+              <a:ext uri="{FF2B5EF4-FFF2-40B4-BE49-F238E27FC236}">
+                <a16:creationId xmlns:a16="http://schemas.microsoft.com/office/drawing/2014/main" id="{601EFCE4-50D8-4758-8632-66F66E213807}"/>
+              </a:ext>
+            </a:extLst>
+          </p:cNvPr>
+          <p:cNvSpPr/>
+          <p:nvPr/>
+        </p:nvSpPr>
+        <p:spPr>
+          <a:xfrm>
+            <a:off x="9567697" y="3526889"/>
+            <a:ext cx="630461" cy="500181"/>
+          </a:xfrm>
+          <a:prstGeom prst="roundRect">
+            <a:avLst>
+              <a:gd name="adj" fmla="val 5301"/>
+            </a:avLst>
+          </a:prstGeom>
+          <a:blipFill>
+            <a:blip r:embed="rId2"/>
+            <a:stretch>
+              <a:fillRect/>
+            </a:stretch>
+          </a:blipFill>
+          <a:ln>
+            <a:noFill/>
+          </a:ln>
+        </p:spPr>
+        <p:style>
+          <a:lnRef idx="2">
+            <a:schemeClr val="accent1">
+              <a:shade val="50000"/>
+            </a:schemeClr>
+          </a:lnRef>
+          <a:fillRef idx="1">
+            <a:schemeClr val="accent1"/>
+          </a:fillRef>
+          <a:effectRef idx="0">
+            <a:schemeClr val="accent1"/>
+          </a:effectRef>
+          <a:fontRef idx="minor">
+            <a:schemeClr val="lt1"/>
+          </a:fontRef>
+        </p:style>
+        <p:txBody>
+          <a:bodyPr rtlCol="0" anchor="ctr"/>
+          <a:lstStyle/>
+          <a:p>
+            <a:pPr algn="ctr"/>
+            <a:endParaRPr lang="ko-KR" altLang="en-US"/>
           </a:p>
         </p:txBody>
       </p:sp>

</xml_diff>

<commit_message>
update brave img, 컨트리뷰톤 Title
</commit_message>
<xml_diff>
--- a/img/img.pptx
+++ b/img/img.pptx
@@ -3609,7 +3609,7 @@
         </p:nvSpPr>
         <p:spPr>
           <a:xfrm>
-            <a:off x="3292628" y="1900722"/>
+            <a:off x="3485668" y="1900722"/>
             <a:ext cx="5606743" cy="1323439"/>
           </a:xfrm>
           <a:prstGeom prst="rect">
@@ -3727,7 +3727,7 @@
         </p:nvSpPr>
         <p:spPr>
           <a:xfrm>
-            <a:off x="3745346" y="3719293"/>
+            <a:off x="3938386" y="3719293"/>
             <a:ext cx="4701308" cy="307777"/>
           </a:xfrm>
           <a:prstGeom prst="rect">
@@ -3820,7 +3820,7 @@
         </p:nvSpPr>
         <p:spPr>
           <a:xfrm>
-            <a:off x="6875635" y="2876425"/>
+            <a:off x="7068675" y="2876425"/>
             <a:ext cx="1826936" cy="276999"/>
           </a:xfrm>
           <a:prstGeom prst="rect">
@@ -3870,7 +3870,7 @@
         </p:nvSpPr>
         <p:spPr>
           <a:xfrm>
-            <a:off x="3838922" y="3087573"/>
+            <a:off x="4031962" y="3087573"/>
             <a:ext cx="4514155" cy="523220"/>
           </a:xfrm>
           <a:prstGeom prst="rect">

</xml_diff>

<commit_message>
Update cover and link
</commit_message>
<xml_diff>
--- a/img/img.pptx
+++ b/img/img.pptx
@@ -261,7 +261,7 @@
           <a:p>
             <a:fld id="{B24269AA-6B5D-4D5A-B50E-E1467D37A8CC}" type="datetimeFigureOut">
               <a:rPr lang="ko-KR" altLang="en-US" smtClean="0"/>
-              <a:t>2020-11-29</a:t>
+              <a:t>2020-12-06</a:t>
             </a:fld>
             <a:endParaRPr lang="ko-KR" altLang="en-US"/>
           </a:p>
@@ -459,7 +459,7 @@
           <a:p>
             <a:fld id="{B24269AA-6B5D-4D5A-B50E-E1467D37A8CC}" type="datetimeFigureOut">
               <a:rPr lang="ko-KR" altLang="en-US" smtClean="0"/>
-              <a:t>2020-11-29</a:t>
+              <a:t>2020-12-06</a:t>
             </a:fld>
             <a:endParaRPr lang="ko-KR" altLang="en-US"/>
           </a:p>
@@ -667,7 +667,7 @@
           <a:p>
             <a:fld id="{B24269AA-6B5D-4D5A-B50E-E1467D37A8CC}" type="datetimeFigureOut">
               <a:rPr lang="ko-KR" altLang="en-US" smtClean="0"/>
-              <a:t>2020-11-29</a:t>
+              <a:t>2020-12-06</a:t>
             </a:fld>
             <a:endParaRPr lang="ko-KR" altLang="en-US"/>
           </a:p>
@@ -865,7 +865,7 @@
           <a:p>
             <a:fld id="{B24269AA-6B5D-4D5A-B50E-E1467D37A8CC}" type="datetimeFigureOut">
               <a:rPr lang="ko-KR" altLang="en-US" smtClean="0"/>
-              <a:t>2020-11-29</a:t>
+              <a:t>2020-12-06</a:t>
             </a:fld>
             <a:endParaRPr lang="ko-KR" altLang="en-US"/>
           </a:p>
@@ -1140,7 +1140,7 @@
           <a:p>
             <a:fld id="{B24269AA-6B5D-4D5A-B50E-E1467D37A8CC}" type="datetimeFigureOut">
               <a:rPr lang="ko-KR" altLang="en-US" smtClean="0"/>
-              <a:t>2020-11-29</a:t>
+              <a:t>2020-12-06</a:t>
             </a:fld>
             <a:endParaRPr lang="ko-KR" altLang="en-US"/>
           </a:p>
@@ -1405,7 +1405,7 @@
           <a:p>
             <a:fld id="{B24269AA-6B5D-4D5A-B50E-E1467D37A8CC}" type="datetimeFigureOut">
               <a:rPr lang="ko-KR" altLang="en-US" smtClean="0"/>
-              <a:t>2020-11-29</a:t>
+              <a:t>2020-12-06</a:t>
             </a:fld>
             <a:endParaRPr lang="ko-KR" altLang="en-US"/>
           </a:p>
@@ -1817,7 +1817,7 @@
           <a:p>
             <a:fld id="{B24269AA-6B5D-4D5A-B50E-E1467D37A8CC}" type="datetimeFigureOut">
               <a:rPr lang="ko-KR" altLang="en-US" smtClean="0"/>
-              <a:t>2020-11-29</a:t>
+              <a:t>2020-12-06</a:t>
             </a:fld>
             <a:endParaRPr lang="ko-KR" altLang="en-US"/>
           </a:p>
@@ -1958,7 +1958,7 @@
           <a:p>
             <a:fld id="{B24269AA-6B5D-4D5A-B50E-E1467D37A8CC}" type="datetimeFigureOut">
               <a:rPr lang="ko-KR" altLang="en-US" smtClean="0"/>
-              <a:t>2020-11-29</a:t>
+              <a:t>2020-12-06</a:t>
             </a:fld>
             <a:endParaRPr lang="ko-KR" altLang="en-US"/>
           </a:p>
@@ -2071,7 +2071,7 @@
           <a:p>
             <a:fld id="{B24269AA-6B5D-4D5A-B50E-E1467D37A8CC}" type="datetimeFigureOut">
               <a:rPr lang="ko-KR" altLang="en-US" smtClean="0"/>
-              <a:t>2020-11-29</a:t>
+              <a:t>2020-12-06</a:t>
             </a:fld>
             <a:endParaRPr lang="ko-KR" altLang="en-US"/>
           </a:p>
@@ -2382,7 +2382,7 @@
           <a:p>
             <a:fld id="{B24269AA-6B5D-4D5A-B50E-E1467D37A8CC}" type="datetimeFigureOut">
               <a:rPr lang="ko-KR" altLang="en-US" smtClean="0"/>
-              <a:t>2020-11-29</a:t>
+              <a:t>2020-12-06</a:t>
             </a:fld>
             <a:endParaRPr lang="ko-KR" altLang="en-US"/>
           </a:p>
@@ -2670,7 +2670,7 @@
           <a:p>
             <a:fld id="{B24269AA-6B5D-4D5A-B50E-E1467D37A8CC}" type="datetimeFigureOut">
               <a:rPr lang="ko-KR" altLang="en-US" smtClean="0"/>
-              <a:t>2020-11-29</a:t>
+              <a:t>2020-12-06</a:t>
             </a:fld>
             <a:endParaRPr lang="ko-KR" altLang="en-US"/>
           </a:p>
@@ -2911,7 +2911,7 @@
           <a:p>
             <a:fld id="{B24269AA-6B5D-4D5A-B50E-E1467D37A8CC}" type="datetimeFigureOut">
               <a:rPr lang="ko-KR" altLang="en-US" smtClean="0"/>
-              <a:t>2020-11-29</a:t>
+              <a:t>2020-12-06</a:t>
             </a:fld>
             <a:endParaRPr lang="ko-KR" altLang="en-US"/>
           </a:p>
@@ -4356,7 +4356,7 @@
                 <a:latin typeface="나눔스퀘어_ac ExtraBold" panose="020B0600000101010101" pitchFamily="50" charset="-127"/>
                 <a:ea typeface="나눔스퀘어_ac ExtraBold" panose="020B0600000101010101" pitchFamily="50" charset="-127"/>
               </a:rPr>
-              <a:t>김서버</a:t>
+              <a:t>용감이</a:t>
             </a:r>
           </a:p>
         </p:txBody>

</xml_diff>

<commit_message>
[Add] dev event whale app
</commit_message>
<xml_diff>
--- a/img/img.pptx
+++ b/img/img.pptx
@@ -9,6 +9,7 @@
     <p:sldId id="257" r:id="rId3"/>
     <p:sldId id="258" r:id="rId4"/>
     <p:sldId id="259" r:id="rId5"/>
+    <p:sldId id="260" r:id="rId6"/>
   </p:sldIdLst>
   <p:sldSz cx="12192000" cy="6858000"/>
   <p:notesSz cx="6858000" cy="9144000"/>
@@ -262,7 +263,7 @@
           <a:p>
             <a:fld id="{B24269AA-6B5D-4D5A-B50E-E1467D37A8CC}" type="datetimeFigureOut">
               <a:rPr lang="ko-KR" altLang="en-US" smtClean="0"/>
-              <a:t>2020-12-12</a:t>
+              <a:t>2020-12-21</a:t>
             </a:fld>
             <a:endParaRPr lang="ko-KR" altLang="en-US"/>
           </a:p>
@@ -460,7 +461,7 @@
           <a:p>
             <a:fld id="{B24269AA-6B5D-4D5A-B50E-E1467D37A8CC}" type="datetimeFigureOut">
               <a:rPr lang="ko-KR" altLang="en-US" smtClean="0"/>
-              <a:t>2020-12-12</a:t>
+              <a:t>2020-12-21</a:t>
             </a:fld>
             <a:endParaRPr lang="ko-KR" altLang="en-US"/>
           </a:p>
@@ -668,7 +669,7 @@
           <a:p>
             <a:fld id="{B24269AA-6B5D-4D5A-B50E-E1467D37A8CC}" type="datetimeFigureOut">
               <a:rPr lang="ko-KR" altLang="en-US" smtClean="0"/>
-              <a:t>2020-12-12</a:t>
+              <a:t>2020-12-21</a:t>
             </a:fld>
             <a:endParaRPr lang="ko-KR" altLang="en-US"/>
           </a:p>
@@ -866,7 +867,7 @@
           <a:p>
             <a:fld id="{B24269AA-6B5D-4D5A-B50E-E1467D37A8CC}" type="datetimeFigureOut">
               <a:rPr lang="ko-KR" altLang="en-US" smtClean="0"/>
-              <a:t>2020-12-12</a:t>
+              <a:t>2020-12-21</a:t>
             </a:fld>
             <a:endParaRPr lang="ko-KR" altLang="en-US"/>
           </a:p>
@@ -1141,7 +1142,7 @@
           <a:p>
             <a:fld id="{B24269AA-6B5D-4D5A-B50E-E1467D37A8CC}" type="datetimeFigureOut">
               <a:rPr lang="ko-KR" altLang="en-US" smtClean="0"/>
-              <a:t>2020-12-12</a:t>
+              <a:t>2020-12-21</a:t>
             </a:fld>
             <a:endParaRPr lang="ko-KR" altLang="en-US"/>
           </a:p>
@@ -1406,7 +1407,7 @@
           <a:p>
             <a:fld id="{B24269AA-6B5D-4D5A-B50E-E1467D37A8CC}" type="datetimeFigureOut">
               <a:rPr lang="ko-KR" altLang="en-US" smtClean="0"/>
-              <a:t>2020-12-12</a:t>
+              <a:t>2020-12-21</a:t>
             </a:fld>
             <a:endParaRPr lang="ko-KR" altLang="en-US"/>
           </a:p>
@@ -1818,7 +1819,7 @@
           <a:p>
             <a:fld id="{B24269AA-6B5D-4D5A-B50E-E1467D37A8CC}" type="datetimeFigureOut">
               <a:rPr lang="ko-KR" altLang="en-US" smtClean="0"/>
-              <a:t>2020-12-12</a:t>
+              <a:t>2020-12-21</a:t>
             </a:fld>
             <a:endParaRPr lang="ko-KR" altLang="en-US"/>
           </a:p>
@@ -1959,7 +1960,7 @@
           <a:p>
             <a:fld id="{B24269AA-6B5D-4D5A-B50E-E1467D37A8CC}" type="datetimeFigureOut">
               <a:rPr lang="ko-KR" altLang="en-US" smtClean="0"/>
-              <a:t>2020-12-12</a:t>
+              <a:t>2020-12-21</a:t>
             </a:fld>
             <a:endParaRPr lang="ko-KR" altLang="en-US"/>
           </a:p>
@@ -2072,7 +2073,7 @@
           <a:p>
             <a:fld id="{B24269AA-6B5D-4D5A-B50E-E1467D37A8CC}" type="datetimeFigureOut">
               <a:rPr lang="ko-KR" altLang="en-US" smtClean="0"/>
-              <a:t>2020-12-12</a:t>
+              <a:t>2020-12-21</a:t>
             </a:fld>
             <a:endParaRPr lang="ko-KR" altLang="en-US"/>
           </a:p>
@@ -2383,7 +2384,7 @@
           <a:p>
             <a:fld id="{B24269AA-6B5D-4D5A-B50E-E1467D37A8CC}" type="datetimeFigureOut">
               <a:rPr lang="ko-KR" altLang="en-US" smtClean="0"/>
-              <a:t>2020-12-12</a:t>
+              <a:t>2020-12-21</a:t>
             </a:fld>
             <a:endParaRPr lang="ko-KR" altLang="en-US"/>
           </a:p>
@@ -2671,7 +2672,7 @@
           <a:p>
             <a:fld id="{B24269AA-6B5D-4D5A-B50E-E1467D37A8CC}" type="datetimeFigureOut">
               <a:rPr lang="ko-KR" altLang="en-US" smtClean="0"/>
-              <a:t>2020-12-12</a:t>
+              <a:t>2020-12-21</a:t>
             </a:fld>
             <a:endParaRPr lang="ko-KR" altLang="en-US"/>
           </a:p>
@@ -2912,7 +2913,7 @@
           <a:p>
             <a:fld id="{B24269AA-6B5D-4D5A-B50E-E1467D37A8CC}" type="datetimeFigureOut">
               <a:rPr lang="ko-KR" altLang="en-US" smtClean="0"/>
-              <a:t>2020-12-12</a:t>
+              <a:t>2020-12-21</a:t>
             </a:fld>
             <a:endParaRPr lang="ko-KR" altLang="en-US"/>
           </a:p>
@@ -4759,6 +4760,149 @@
 </p:sld>
 </file>
 
+<file path=ppt/slides/slide5.xml><?xml version="1.0" encoding="utf-8"?>
+<p:sld xmlns:a="http://schemas.openxmlformats.org/drawingml/2006/main" xmlns:r="http://schemas.openxmlformats.org/officeDocument/2006/relationships" xmlns:p="http://schemas.openxmlformats.org/presentationml/2006/main">
+  <p:cSld>
+    <p:spTree>
+      <p:nvGrpSpPr>
+        <p:cNvPr id="1" name=""/>
+        <p:cNvGrpSpPr/>
+        <p:nvPr/>
+      </p:nvGrpSpPr>
+      <p:grpSpPr>
+        <a:xfrm>
+          <a:off x="0" y="0"/>
+          <a:ext cx="0" cy="0"/>
+          <a:chOff x="0" y="0"/>
+          <a:chExt cx="0" cy="0"/>
+        </a:xfrm>
+      </p:grpSpPr>
+      <p:pic>
+        <p:nvPicPr>
+          <p:cNvPr id="5" name="그림 4">
+            <a:extLst>
+              <a:ext uri="{FF2B5EF4-FFF2-40B4-BE49-F238E27FC236}">
+                <a16:creationId xmlns:a16="http://schemas.microsoft.com/office/drawing/2014/main" id="{DD61B7E5-A81A-4CEB-894A-C4215C29159E}"/>
+              </a:ext>
+            </a:extLst>
+          </p:cNvPr>
+          <p:cNvPicPr>
+            <a:picLocks noChangeAspect="1"/>
+          </p:cNvPicPr>
+          <p:nvPr/>
+        </p:nvPicPr>
+        <p:blipFill>
+          <a:blip r:embed="rId2">
+            <a:extLst>
+              <a:ext uri="{28A0092B-C50C-407E-A947-70E740481C1C}">
+                <a14:useLocalDpi xmlns:a14="http://schemas.microsoft.com/office/drawing/2010/main" val="0"/>
+              </a:ext>
+            </a:extLst>
+          </a:blip>
+          <a:stretch>
+            <a:fillRect/>
+          </a:stretch>
+        </p:blipFill>
+        <p:spPr>
+          <a:xfrm>
+            <a:off x="3573536" y="2116546"/>
+            <a:ext cx="1629439" cy="1615917"/>
+          </a:xfrm>
+          <a:prstGeom prst="rect">
+            <a:avLst/>
+          </a:prstGeom>
+        </p:spPr>
+      </p:pic>
+      <p:pic>
+        <p:nvPicPr>
+          <p:cNvPr id="1026" name="Picture 2" descr="헉헉 네이버 웨일 고래 너무 귀엽다">
+            <a:extLst>
+              <a:ext uri="{FF2B5EF4-FFF2-40B4-BE49-F238E27FC236}">
+                <a16:creationId xmlns:a16="http://schemas.microsoft.com/office/drawing/2014/main" id="{9322F158-1E8F-4C1E-97BA-ECC7D1BCE2E9}"/>
+              </a:ext>
+            </a:extLst>
+          </p:cNvPr>
+          <p:cNvPicPr>
+            <a:picLocks noChangeAspect="1" noChangeArrowheads="1"/>
+          </p:cNvPicPr>
+          <p:nvPr/>
+        </p:nvPicPr>
+        <p:blipFill>
+          <a:blip r:embed="rId3">
+            <a:extLst>
+              <a:ext uri="{28A0092B-C50C-407E-A947-70E740481C1C}">
+                <a14:useLocalDpi xmlns:a14="http://schemas.microsoft.com/office/drawing/2010/main" val="0"/>
+              </a:ext>
+            </a:extLst>
+          </a:blip>
+          <a:srcRect/>
+          <a:stretch>
+            <a:fillRect/>
+          </a:stretch>
+        </p:blipFill>
+        <p:spPr bwMode="auto">
+          <a:xfrm>
+            <a:off x="5474902" y="1959415"/>
+            <a:ext cx="1781257" cy="1773048"/>
+          </a:xfrm>
+          <a:prstGeom prst="rect">
+            <a:avLst/>
+          </a:prstGeom>
+          <a:noFill/>
+          <a:extLst>
+            <a:ext uri="{909E8E84-426E-40DD-AFC4-6F175D3DCCD1}">
+              <a14:hiddenFill xmlns:a14="http://schemas.microsoft.com/office/drawing/2010/main">
+                <a:solidFill>
+                  <a:srgbClr val="FFFFFF"/>
+                </a:solidFill>
+              </a14:hiddenFill>
+            </a:ext>
+          </a:extLst>
+        </p:spPr>
+      </p:pic>
+      <p:pic>
+        <p:nvPicPr>
+          <p:cNvPr id="7" name="그림 6">
+            <a:extLst>
+              <a:ext uri="{FF2B5EF4-FFF2-40B4-BE49-F238E27FC236}">
+                <a16:creationId xmlns:a16="http://schemas.microsoft.com/office/drawing/2014/main" id="{28FBF561-B1FA-4A5C-AFFC-829977A1A3A5}"/>
+              </a:ext>
+            </a:extLst>
+          </p:cNvPr>
+          <p:cNvPicPr>
+            <a:picLocks noChangeAspect="1"/>
+          </p:cNvPicPr>
+          <p:nvPr/>
+        </p:nvPicPr>
+        <p:blipFill>
+          <a:blip r:embed="rId4"/>
+          <a:stretch>
+            <a:fillRect/>
+          </a:stretch>
+        </p:blipFill>
+        <p:spPr>
+          <a:xfrm>
+            <a:off x="6338392" y="5361523"/>
+            <a:ext cx="1724025" cy="600075"/>
+          </a:xfrm>
+          <a:prstGeom prst="rect">
+            <a:avLst/>
+          </a:prstGeom>
+        </p:spPr>
+      </p:pic>
+    </p:spTree>
+    <p:extLst>
+      <p:ext uri="{BB962C8B-B14F-4D97-AF65-F5344CB8AC3E}">
+        <p14:creationId xmlns:p14="http://schemas.microsoft.com/office/powerpoint/2010/main" val="2021048305"/>
+      </p:ext>
+    </p:extLst>
+  </p:cSld>
+  <p:clrMapOvr>
+    <a:masterClrMapping/>
+  </p:clrMapOvr>
+</p:sld>
+</file>
+
 <file path=ppt/theme/theme1.xml><?xml version="1.0" encoding="utf-8"?>
 <a:theme xmlns:a="http://schemas.openxmlformats.org/drawingml/2006/main" name="Office 테마">
   <a:themeElements>

</xml_diff>